<commit_message>
Added final submission folder
</commit_message>
<xml_diff>
--- a/FYP documentation/PresentationSlides.pptx
+++ b/FYP documentation/PresentationSlides.pptx
@@ -17141,14 +17141,14 @@
           <p:nvPr>
             <p:extLst>
               <p:ext uri="{D42A27DB-BD31-4B8C-83A1-F6EECF244321}">
-                <p14:modId xmlns:p14="http://schemas.microsoft.com/office/powerpoint/2010/main" val="960572942"/>
+                <p14:modId xmlns:p14="http://schemas.microsoft.com/office/powerpoint/2010/main" val="3030940947"/>
               </p:ext>
             </p:extLst>
           </p:nvPr>
         </p:nvGraphicFramePr>
         <p:xfrm>
           <a:off x="591127" y="3004350"/>
-          <a:ext cx="5708071" cy="2440363"/>
+          <a:ext cx="6123709" cy="2211674"/>
         </p:xfrm>
         <a:graphic>
           <a:graphicData uri="http://schemas.openxmlformats.org/drawingml/2006/table">
@@ -17157,21 +17157,21 @@
                 <a:tableStyleId>{69012ECD-51FC-41F1-AA8D-1B2483CD663E}</a:tableStyleId>
               </a:tblPr>
               <a:tblGrid>
-                <a:gridCol w="1801091">
+                <a:gridCol w="1932239">
                   <a:extLst>
                     <a:ext uri="{9D8B030D-6E8A-4147-A177-3AD203B41FA5}">
                       <a16:colId xmlns:a16="http://schemas.microsoft.com/office/drawing/2014/main" val="3610142237"/>
                     </a:ext>
                   </a:extLst>
                 </a:gridCol>
-                <a:gridCol w="1181502">
+                <a:gridCol w="1267534">
                   <a:extLst>
                     <a:ext uri="{9D8B030D-6E8A-4147-A177-3AD203B41FA5}">
                       <a16:colId xmlns:a16="http://schemas.microsoft.com/office/drawing/2014/main" val="2526564443"/>
                     </a:ext>
                   </a:extLst>
                 </a:gridCol>
-                <a:gridCol w="2725478">
+                <a:gridCol w="2923936">
                   <a:extLst>
                     <a:ext uri="{9D8B030D-6E8A-4147-A177-3AD203B41FA5}">
                       <a16:colId xmlns:a16="http://schemas.microsoft.com/office/drawing/2014/main" val="1496628720"/>
@@ -17430,7 +17430,7 @@
                           <a:cs typeface="Lato"/>
                           <a:sym typeface="Arial"/>
                         </a:rPr>
-                        <a:t>Hyeocheol</a:t>
+                        <a:t>Hyeoncheol</a:t>
                       </a:r>
                       <a:endParaRPr lang="en-SG" sz="1800" b="0" i="0" u="none" strike="noStrike" cap="none" dirty="0">
                         <a:solidFill>

</xml_diff>

<commit_message>
Added a folder with all print documents
</commit_message>
<xml_diff>
--- a/FYP documentation/PresentationSlides.pptx
+++ b/FYP documentation/PresentationSlides.pptx
@@ -29,14 +29,14 @@
   <p:notesSz cx="6858000" cy="9144000"/>
   <p:embeddedFontLst>
     <p:embeddedFont>
-      <p:font typeface="Lato" panose="020B0604020202020204" charset="0"/>
+      <p:font typeface="Raleway" panose="020B0604020202020204" charset="0"/>
       <p:regular r:id="rId19"/>
       <p:bold r:id="rId20"/>
       <p:italic r:id="rId21"/>
       <p:boldItalic r:id="rId22"/>
     </p:embeddedFont>
     <p:embeddedFont>
-      <p:font typeface="Raleway" panose="020B0604020202020204" charset="0"/>
+      <p:font typeface="Lato" panose="020B0604020202020204" charset="0"/>
       <p:regular r:id="rId23"/>
       <p:bold r:id="rId24"/>
       <p:italic r:id="rId25"/>

</xml_diff>